<commit_message>
Modification de code R & du PowerPoint + Ajout Logo
</commit_message>
<xml_diff>
--- a/model_gk.pptx
+++ b/model_gk.pptx
@@ -3129,7 +3129,7 @@
           <a:p>
             <a:fld id="{DBB368B6-8F1E-4793-A2C9-E771AFC990C4}" type="datetimeFigureOut">
               <a:rPr lang="fr-FR" smtClean="0"/>
-              <a:t>11/01/2024</a:t>
+              <a:t>02/02/2024</a:t>
             </a:fld>
             <a:endParaRPr lang="fr-FR"/>
           </a:p>
@@ -3287,7 +3287,7 @@
           <a:p>
             <a:fld id="{13B46D97-95A2-4704-9DCD-0DA6AA19F912}" type="slidenum">
               <a:rPr lang="fr-FR" smtClean="0"/>
-              <a:t>‹#›</a:t>
+              <a:t>‹N°›</a:t>
             </a:fld>
             <a:endParaRPr lang="fr-FR"/>
           </a:p>
@@ -3447,7 +3447,7 @@
             <a:avLst/>
           </a:prstGeom>
           <a:solidFill>
-            <a:srgbClr val="2C223F"/>
+            <a:srgbClr val="3F2B56"/>
           </a:solidFill>
         </p:spPr>
       </p:pic>
@@ -4930,7 +4930,7 @@
         <p:spPr>
           <a:xfrm>
             <a:off x="254798" y="151766"/>
-            <a:ext cx="11074954" cy="758692"/>
+            <a:ext cx="10083002" cy="758692"/>
           </a:xfrm>
           <a:prstGeom prst="rect">
             <a:avLst/>
@@ -4957,6 +4957,42 @@
           </a:p>
         </p:txBody>
       </p:sp>
+      <p:pic>
+        <p:nvPicPr>
+          <p:cNvPr id="5" name="Image 4" descr="Une image contenant Graphique, Police, graphisme, logo&#10;&#10;Description générée automatiquement">
+            <a:extLst>
+              <a:ext uri="{FF2B5EF4-FFF2-40B4-BE49-F238E27FC236}">
+                <a16:creationId xmlns:a16="http://schemas.microsoft.com/office/drawing/2014/main" id="{1EAB132B-4DD1-009F-B746-51EFC31947CC}"/>
+              </a:ext>
+            </a:extLst>
+          </p:cNvPr>
+          <p:cNvPicPr>
+            <a:picLocks noChangeAspect="1"/>
+          </p:cNvPicPr>
+          <p:nvPr userDrawn="1"/>
+        </p:nvPicPr>
+        <p:blipFill>
+          <a:blip r:embed="rId3">
+            <a:extLst>
+              <a:ext uri="{28A0092B-C50C-407E-A947-70E740481C1C}">
+                <a14:useLocalDpi xmlns:a14="http://schemas.microsoft.com/office/drawing/2010/main" val="0"/>
+              </a:ext>
+            </a:extLst>
+          </a:blip>
+          <a:stretch>
+            <a:fillRect/>
+          </a:stretch>
+        </p:blipFill>
+        <p:spPr>
+          <a:xfrm>
+            <a:off x="10337800" y="392964"/>
+            <a:ext cx="1724286" cy="276296"/>
+          </a:xfrm>
+          <a:prstGeom prst="rect">
+            <a:avLst/>
+          </a:prstGeom>
+        </p:spPr>
+      </p:pic>
     </p:spTree>
     <p:extLst>
       <p:ext uri="{BB962C8B-B14F-4D97-AF65-F5344CB8AC3E}">
@@ -5608,7 +5644,7 @@
           <a:p>
             <a:fld id="{61306CF6-01C9-416E-9DA6-B93269DCA697}" type="datetimeFigureOut">
               <a:rPr lang="fr-FR" smtClean="0"/>
-              <a:t>11/01/2024</a:t>
+              <a:t>02/02/2024</a:t>
             </a:fld>
             <a:endParaRPr lang="fr-FR"/>
           </a:p>
@@ -5698,7 +5734,7 @@
           <a:p>
             <a:fld id="{78ED0C9F-9D7F-4727-BCBB-0B7FEFFEF517}" type="slidenum">
               <a:rPr lang="fr-FR" smtClean="0"/>
-              <a:t>‹#›</a:t>
+              <a:t>‹N°›</a:t>
             </a:fld>
             <a:endParaRPr lang="fr-FR"/>
           </a:p>

</xml_diff>

<commit_message>
Code R & ppt
</commit_message>
<xml_diff>
--- a/model_gk.pptx
+++ b/model_gk.pptx
@@ -1621,30 +1621,6 @@
     </pc:docChg>
   </pc:docChgLst>
   <pc:docChgLst>
-    <pc:chgData name="DEMEAUX Julien" userId="8b7402ba-768c-4091-8d83-67d7533017bc" providerId="ADAL" clId="{156137F3-42CC-4C6A-A8EC-6FA3958211CE}"/>
-    <pc:docChg chg="modSld">
-      <pc:chgData name="DEMEAUX Julien" userId="8b7402ba-768c-4091-8d83-67d7533017bc" providerId="ADAL" clId="{156137F3-42CC-4C6A-A8EC-6FA3958211CE}" dt="2022-11-07T09:19:05.170" v="0" actId="167"/>
-      <pc:docMkLst>
-        <pc:docMk/>
-      </pc:docMkLst>
-      <pc:sldChg chg="modSp mod">
-        <pc:chgData name="DEMEAUX Julien" userId="8b7402ba-768c-4091-8d83-67d7533017bc" providerId="ADAL" clId="{156137F3-42CC-4C6A-A8EC-6FA3958211CE}" dt="2022-11-07T09:19:05.170" v="0" actId="167"/>
-        <pc:sldMkLst>
-          <pc:docMk/>
-          <pc:sldMk cId="1370419559" sldId="274"/>
-        </pc:sldMkLst>
-        <pc:picChg chg="ord">
-          <ac:chgData name="DEMEAUX Julien" userId="8b7402ba-768c-4091-8d83-67d7533017bc" providerId="ADAL" clId="{156137F3-42CC-4C6A-A8EC-6FA3958211CE}" dt="2022-11-07T09:19:05.170" v="0" actId="167"/>
-          <ac:picMkLst>
-            <pc:docMk/>
-            <pc:sldMk cId="1370419559" sldId="274"/>
-            <ac:picMk id="10" creationId="{4DBE8779-12E7-19D8-5A4E-9F06E93CF57C}"/>
-          </ac:picMkLst>
-        </pc:picChg>
-      </pc:sldChg>
-    </pc:docChg>
-  </pc:docChgLst>
-  <pc:docChgLst>
     <pc:chgData name="DEMEAUX Julien" userId="S::julien.demeaux@toulousefc.com::8b7402ba-768c-4091-8d83-67d7533017bc" providerId="AD" clId="Web-{D9476077-A27C-ED5D-5E60-ED85FE96F03F}"/>
     <pc:docChg chg="addSld modSld sldOrd">
       <pc:chgData name="DEMEAUX Julien" userId="S::julien.demeaux@toulousefc.com::8b7402ba-768c-4091-8d83-67d7533017bc" providerId="AD" clId="Web-{D9476077-A27C-ED5D-5E60-ED85FE96F03F}" dt="2022-11-02T10:07:45.844" v="31"/>
@@ -1711,6 +1687,30 @@
             <ac:spMk id="3" creationId="{BD2B3AEA-6FD2-49AD-A3B3-97533BD95B94}"/>
           </ac:spMkLst>
         </pc:spChg>
+      </pc:sldChg>
+    </pc:docChg>
+  </pc:docChgLst>
+  <pc:docChgLst>
+    <pc:chgData name="DEMEAUX Julien" userId="8b7402ba-768c-4091-8d83-67d7533017bc" providerId="ADAL" clId="{156137F3-42CC-4C6A-A8EC-6FA3958211CE}"/>
+    <pc:docChg chg="modSld">
+      <pc:chgData name="DEMEAUX Julien" userId="8b7402ba-768c-4091-8d83-67d7533017bc" providerId="ADAL" clId="{156137F3-42CC-4C6A-A8EC-6FA3958211CE}" dt="2022-11-07T09:19:05.170" v="0" actId="167"/>
+      <pc:docMkLst>
+        <pc:docMk/>
+      </pc:docMkLst>
+      <pc:sldChg chg="modSp mod">
+        <pc:chgData name="DEMEAUX Julien" userId="8b7402ba-768c-4091-8d83-67d7533017bc" providerId="ADAL" clId="{156137F3-42CC-4C6A-A8EC-6FA3958211CE}" dt="2022-11-07T09:19:05.170" v="0" actId="167"/>
+        <pc:sldMkLst>
+          <pc:docMk/>
+          <pc:sldMk cId="1370419559" sldId="274"/>
+        </pc:sldMkLst>
+        <pc:picChg chg="ord">
+          <ac:chgData name="DEMEAUX Julien" userId="8b7402ba-768c-4091-8d83-67d7533017bc" providerId="ADAL" clId="{156137F3-42CC-4C6A-A8EC-6FA3958211CE}" dt="2022-11-07T09:19:05.170" v="0" actId="167"/>
+          <ac:picMkLst>
+            <pc:docMk/>
+            <pc:sldMk cId="1370419559" sldId="274"/>
+            <ac:picMk id="10" creationId="{4DBE8779-12E7-19D8-5A4E-9F06E93CF57C}"/>
+          </ac:picMkLst>
+        </pc:picChg>
       </pc:sldChg>
     </pc:docChg>
   </pc:docChgLst>
@@ -3502,8 +3502,12 @@
           </a:lstStyle>
           <a:p>
             <a:r>
-              <a:rPr lang="fr-FR" sz="5400" b="0" dirty="0"/>
-              <a:t>Retour gardien de but</a:t>
+              <a:rPr lang="fr-FR" sz="5400" b="0" dirty="0" err="1"/>
+              <a:t>Goalkeeper</a:t>
+            </a:r>
+            <a:r>
+              <a:rPr lang="fr-FR" sz="5400" b="0"/>
+              <a:t> Post-match</a:t>
             </a:r>
             <a:br>
               <a:rPr lang="fr-FR" dirty="0"/>
@@ -3908,8 +3912,16 @@
           </a:lstStyle>
           <a:p>
             <a:r>
+              <a:rPr lang="fr-FR" sz="5400" b="0" dirty="0" err="1"/>
+              <a:t>Goalkeeper</a:t>
+            </a:r>
+            <a:r>
               <a:rPr lang="fr-FR" sz="5400" b="0" dirty="0"/>
-              <a:t>préparation gardien de but</a:t>
+              <a:t> </a:t>
+            </a:r>
+            <a:r>
+              <a:rPr lang="fr-FR" sz="5400" b="0" dirty="0" err="1"/>
+              <a:t>Preparation</a:t>
             </a:r>
             <a:br>
               <a:rPr lang="fr-FR" dirty="0"/>

</xml_diff>